<commit_message>
Updated slide, added scope, changed title
</commit_message>
<xml_diff>
--- a/Project 1 PPT.pptx
+++ b/Project 1 PPT.pptx
@@ -7,10 +7,11 @@
   <p:sldIdLst>
     <p:sldId id="256" r:id="rId2"/>
     <p:sldId id="257" r:id="rId3"/>
-    <p:sldId id="258" r:id="rId4"/>
-    <p:sldId id="259" r:id="rId5"/>
-    <p:sldId id="260" r:id="rId6"/>
-    <p:sldId id="261" r:id="rId7"/>
+    <p:sldId id="262" r:id="rId4"/>
+    <p:sldId id="258" r:id="rId5"/>
+    <p:sldId id="259" r:id="rId6"/>
+    <p:sldId id="260" r:id="rId7"/>
+    <p:sldId id="261" r:id="rId8"/>
   </p:sldIdLst>
   <p:sldSz cx="12192000" cy="6858000"/>
   <p:notesSz cx="6858000" cy="9144000"/>
@@ -109,6 +110,11 @@
       </a:defRPr>
     </a:lvl9pPr>
   </p:defaultTextStyle>
+  <p:extLst>
+    <p:ext uri="{EFAFB233-063F-42B5-8137-9DF3F51BA10A}">
+      <p15:sldGuideLst xmlns:p15="http://schemas.microsoft.com/office/powerpoint/2012/main"/>
+    </p:ext>
+  </p:extLst>
 </p:presentation>
 </file>
 
@@ -117,12 +123,12 @@
   <pc:docChgLst>
     <pc:chgData name="Stan Ejiobi" userId="bfdee1cc2c219db3" providerId="LiveId" clId="{EE5D1454-DE28-4F36-8880-5666914C2813}"/>
     <pc:docChg chg="undo custSel addSld modSld">
-      <pc:chgData name="Stan Ejiobi" userId="bfdee1cc2c219db3" providerId="LiveId" clId="{EE5D1454-DE28-4F36-8880-5666914C2813}" dt="2023-04-29T15:13:35.101" v="231" actId="12"/>
+      <pc:chgData name="Stan Ejiobi" userId="bfdee1cc2c219db3" providerId="LiveId" clId="{EE5D1454-DE28-4F36-8880-5666914C2813}" dt="2023-05-02T02:44:08.409" v="563" actId="20577"/>
       <pc:docMkLst>
         <pc:docMk/>
       </pc:docMkLst>
       <pc:sldChg chg="addSp delSp modSp mod setBg">
-        <pc:chgData name="Stan Ejiobi" userId="bfdee1cc2c219db3" providerId="LiveId" clId="{EE5D1454-DE28-4F36-8880-5666914C2813}" dt="2023-04-29T15:10:17.700" v="136" actId="26606"/>
+        <pc:chgData name="Stan Ejiobi" userId="bfdee1cc2c219db3" providerId="LiveId" clId="{EE5D1454-DE28-4F36-8880-5666914C2813}" dt="2023-05-02T02:37:06.102" v="240" actId="20577"/>
         <pc:sldMkLst>
           <pc:docMk/>
           <pc:sldMk cId="960932777" sldId="256"/>
@@ -136,7 +142,7 @@
           </ac:spMkLst>
         </pc:spChg>
         <pc:spChg chg="mod">
-          <ac:chgData name="Stan Ejiobi" userId="bfdee1cc2c219db3" providerId="LiveId" clId="{EE5D1454-DE28-4F36-8880-5666914C2813}" dt="2023-04-29T15:10:17.700" v="136" actId="26606"/>
+          <ac:chgData name="Stan Ejiobi" userId="bfdee1cc2c219db3" providerId="LiveId" clId="{EE5D1454-DE28-4F36-8880-5666914C2813}" dt="2023-05-02T02:37:06.102" v="240" actId="20577"/>
           <ac:spMkLst>
             <pc:docMk/>
             <pc:sldMk cId="960932777" sldId="256"/>
@@ -353,7 +359,7 @@
         </pc:spChg>
       </pc:sldChg>
       <pc:sldChg chg="addSp delSp modSp mod setBg">
-        <pc:chgData name="Stan Ejiobi" userId="bfdee1cc2c219db3" providerId="LiveId" clId="{EE5D1454-DE28-4F36-8880-5666914C2813}" dt="2023-04-29T15:10:17.763" v="137" actId="26606"/>
+        <pc:chgData name="Stan Ejiobi" userId="bfdee1cc2c219db3" providerId="LiveId" clId="{EE5D1454-DE28-4F36-8880-5666914C2813}" dt="2023-05-02T02:40:15.394" v="324" actId="21"/>
         <pc:sldMkLst>
           <pc:docMk/>
           <pc:sldMk cId="2776023487" sldId="257"/>
@@ -366,8 +372,8 @@
             <ac:spMk id="2" creationId="{A1D728FB-AAEC-5734-8338-74212E2CFE7F}"/>
           </ac:spMkLst>
         </pc:spChg>
-        <pc:spChg chg="add del">
-          <ac:chgData name="Stan Ejiobi" userId="bfdee1cc2c219db3" providerId="LiveId" clId="{EE5D1454-DE28-4F36-8880-5666914C2813}" dt="2023-04-29T15:10:17.763" v="137" actId="26606"/>
+        <pc:spChg chg="add del mod">
+          <ac:chgData name="Stan Ejiobi" userId="bfdee1cc2c219db3" providerId="LiveId" clId="{EE5D1454-DE28-4F36-8880-5666914C2813}" dt="2023-05-02T02:40:15.394" v="324" actId="21"/>
           <ac:spMkLst>
             <pc:docMk/>
             <pc:sldMk cId="2776023487" sldId="257"/>
@@ -842,6 +848,29 @@
             <ac:picMk id="7" creationId="{20D9B4CA-94AD-91D8-D3A2-BD291823D496}"/>
           </ac:picMkLst>
         </pc:picChg>
+      </pc:sldChg>
+      <pc:sldChg chg="modSp new mod">
+        <pc:chgData name="Stan Ejiobi" userId="bfdee1cc2c219db3" providerId="LiveId" clId="{EE5D1454-DE28-4F36-8880-5666914C2813}" dt="2023-05-02T02:44:08.409" v="563" actId="20577"/>
+        <pc:sldMkLst>
+          <pc:docMk/>
+          <pc:sldMk cId="2506259767" sldId="262"/>
+        </pc:sldMkLst>
+        <pc:spChg chg="mod">
+          <ac:chgData name="Stan Ejiobi" userId="bfdee1cc2c219db3" providerId="LiveId" clId="{EE5D1454-DE28-4F36-8880-5666914C2813}" dt="2023-05-02T02:40:05.789" v="323" actId="20577"/>
+          <ac:spMkLst>
+            <pc:docMk/>
+            <pc:sldMk cId="2506259767" sldId="262"/>
+            <ac:spMk id="2" creationId="{71C7B195-9FDB-9E84-DAAB-0181262BB776}"/>
+          </ac:spMkLst>
+        </pc:spChg>
+        <pc:spChg chg="mod">
+          <ac:chgData name="Stan Ejiobi" userId="bfdee1cc2c219db3" providerId="LiveId" clId="{EE5D1454-DE28-4F36-8880-5666914C2813}" dt="2023-05-02T02:44:08.409" v="563" actId="20577"/>
+          <ac:spMkLst>
+            <pc:docMk/>
+            <pc:sldMk cId="2506259767" sldId="262"/>
+            <ac:spMk id="3" creationId="{5ED0E091-A785-C9D3-DFF2-80E157D5AD14}"/>
+          </ac:spMkLst>
+        </pc:spChg>
       </pc:sldChg>
     </pc:docChg>
   </pc:docChgLst>
@@ -995,7 +1024,7 @@
           <a:p>
             <a:fld id="{6A129023-3AF9-4412-A39D-F0BE5F885D2D}" type="datetimeFigureOut">
               <a:rPr lang="en-US" smtClean="0"/>
-              <a:t>4/29/2023</a:t>
+              <a:t>5/1/2023</a:t>
             </a:fld>
             <a:endParaRPr lang="en-US"/>
           </a:p>
@@ -1193,7 +1222,7 @@
           <a:p>
             <a:fld id="{6A129023-3AF9-4412-A39D-F0BE5F885D2D}" type="datetimeFigureOut">
               <a:rPr lang="en-US" smtClean="0"/>
-              <a:t>4/29/2023</a:t>
+              <a:t>5/1/2023</a:t>
             </a:fld>
             <a:endParaRPr lang="en-US"/>
           </a:p>
@@ -1401,7 +1430,7 @@
           <a:p>
             <a:fld id="{6A129023-3AF9-4412-A39D-F0BE5F885D2D}" type="datetimeFigureOut">
               <a:rPr lang="en-US" smtClean="0"/>
-              <a:t>4/29/2023</a:t>
+              <a:t>5/1/2023</a:t>
             </a:fld>
             <a:endParaRPr lang="en-US"/>
           </a:p>
@@ -1599,7 +1628,7 @@
           <a:p>
             <a:fld id="{6A129023-3AF9-4412-A39D-F0BE5F885D2D}" type="datetimeFigureOut">
               <a:rPr lang="en-US" smtClean="0"/>
-              <a:t>4/29/2023</a:t>
+              <a:t>5/1/2023</a:t>
             </a:fld>
             <a:endParaRPr lang="en-US"/>
           </a:p>
@@ -1874,7 +1903,7 @@
           <a:p>
             <a:fld id="{6A129023-3AF9-4412-A39D-F0BE5F885D2D}" type="datetimeFigureOut">
               <a:rPr lang="en-US" smtClean="0"/>
-              <a:t>4/29/2023</a:t>
+              <a:t>5/1/2023</a:t>
             </a:fld>
             <a:endParaRPr lang="en-US"/>
           </a:p>
@@ -2139,7 +2168,7 @@
           <a:p>
             <a:fld id="{6A129023-3AF9-4412-A39D-F0BE5F885D2D}" type="datetimeFigureOut">
               <a:rPr lang="en-US" smtClean="0"/>
-              <a:t>4/29/2023</a:t>
+              <a:t>5/1/2023</a:t>
             </a:fld>
             <a:endParaRPr lang="en-US"/>
           </a:p>
@@ -2551,7 +2580,7 @@
           <a:p>
             <a:fld id="{6A129023-3AF9-4412-A39D-F0BE5F885D2D}" type="datetimeFigureOut">
               <a:rPr lang="en-US" smtClean="0"/>
-              <a:t>4/29/2023</a:t>
+              <a:t>5/1/2023</a:t>
             </a:fld>
             <a:endParaRPr lang="en-US"/>
           </a:p>
@@ -2692,7 +2721,7 @@
           <a:p>
             <a:fld id="{6A129023-3AF9-4412-A39D-F0BE5F885D2D}" type="datetimeFigureOut">
               <a:rPr lang="en-US" smtClean="0"/>
-              <a:t>4/29/2023</a:t>
+              <a:t>5/1/2023</a:t>
             </a:fld>
             <a:endParaRPr lang="en-US"/>
           </a:p>
@@ -2805,7 +2834,7 @@
           <a:p>
             <a:fld id="{6A129023-3AF9-4412-A39D-F0BE5F885D2D}" type="datetimeFigureOut">
               <a:rPr lang="en-US" smtClean="0"/>
-              <a:t>4/29/2023</a:t>
+              <a:t>5/1/2023</a:t>
             </a:fld>
             <a:endParaRPr lang="en-US"/>
           </a:p>
@@ -3116,7 +3145,7 @@
           <a:p>
             <a:fld id="{6A129023-3AF9-4412-A39D-F0BE5F885D2D}" type="datetimeFigureOut">
               <a:rPr lang="en-US" smtClean="0"/>
-              <a:t>4/29/2023</a:t>
+              <a:t>5/1/2023</a:t>
             </a:fld>
             <a:endParaRPr lang="en-US"/>
           </a:p>
@@ -3404,7 +3433,7 @@
           <a:p>
             <a:fld id="{6A129023-3AF9-4412-A39D-F0BE5F885D2D}" type="datetimeFigureOut">
               <a:rPr lang="en-US" smtClean="0"/>
-              <a:t>4/29/2023</a:t>
+              <a:t>5/1/2023</a:t>
             </a:fld>
             <a:endParaRPr lang="en-US"/>
           </a:p>
@@ -3645,7 +3674,7 @@
           <a:p>
             <a:fld id="{6A129023-3AF9-4412-A39D-F0BE5F885D2D}" type="datetimeFigureOut">
               <a:rPr lang="en-US" smtClean="0"/>
-              <a:t>4/29/2023</a:t>
+              <a:t>5/1/2023</a:t>
             </a:fld>
             <a:endParaRPr lang="en-US"/>
           </a:p>
@@ -4127,49 +4156,74 @@
           <a:lstStyle/>
           <a:p>
             <a:r>
-              <a:rPr lang="en-US" sz="3600"/>
+              <a:rPr lang="en-US" sz="3600" dirty="0"/>
               <a:t>PROJECT 1</a:t>
             </a:r>
           </a:p>
           <a:p>
             <a:pPr algn="l"/>
             <a:r>
-              <a:rPr lang="en-US"/>
-              <a:t>TITLE: Impact of Covid 19 on Suicidal Rate</a:t>
+              <a:rPr lang="en-US" dirty="0"/>
+              <a:t>TITLE: The Impact of Covid-19 on Suicide Rate</a:t>
             </a:r>
           </a:p>
           <a:p>
             <a:pPr algn="l"/>
-            <a:endParaRPr lang="en-US"/>
+            <a:endParaRPr lang="en-US" dirty="0"/>
           </a:p>
           <a:p>
             <a:pPr algn="l"/>
             <a:r>
-              <a:rPr lang="en-US"/>
-              <a:t>Group Members: Armine Arutyunyan</a:t>
-            </a:r>
+              <a:rPr lang="en-US" dirty="0"/>
+              <a:t>Group Members: Armine </a:t>
+            </a:r>
+            <a:r>
+              <a:rPr lang="en-US" dirty="0" err="1"/>
+              <a:t>Arutyunyan</a:t>
+            </a:r>
+            <a:endParaRPr lang="en-US" dirty="0"/>
           </a:p>
           <a:p>
             <a:pPr algn="l"/>
             <a:r>
-              <a:rPr lang="en-US"/>
-              <a:t>                                Birundha Varatharajan</a:t>
-            </a:r>
+              <a:rPr lang="en-US" dirty="0"/>
+              <a:t>                                </a:t>
+            </a:r>
+            <a:r>
+              <a:rPr lang="en-US" dirty="0" err="1"/>
+              <a:t>Birundha</a:t>
+            </a:r>
+            <a:r>
+              <a:rPr lang="en-US" dirty="0"/>
+              <a:t> </a:t>
+            </a:r>
+            <a:r>
+              <a:rPr lang="en-US" dirty="0" err="1"/>
+              <a:t>Varatharajan</a:t>
+            </a:r>
+            <a:endParaRPr lang="en-US" dirty="0"/>
           </a:p>
           <a:p>
             <a:pPr algn="l"/>
             <a:r>
-              <a:rPr lang="en-US"/>
-              <a:t>                                 Ammanesi Adamu</a:t>
+              <a:rPr lang="en-US" dirty="0"/>
+              <a:t>                                 </a:t>
+            </a:r>
+            <a:r>
+              <a:rPr lang="en-US" dirty="0" err="1"/>
+              <a:t>Ammanesi</a:t>
+            </a:r>
+            <a:r>
+              <a:rPr lang="en-US" dirty="0"/>
+              <a:t> Adamu</a:t>
             </a:r>
           </a:p>
           <a:p>
             <a:pPr algn="l"/>
             <a:r>
-              <a:rPr lang="en-US"/>
+              <a:rPr lang="en-US" dirty="0"/>
               <a:t>                                 Stan Ejiobi</a:t>
             </a:r>
-            <a:endParaRPr lang="en-US" dirty="0"/>
           </a:p>
         </p:txBody>
       </p:sp>
@@ -4258,12 +4312,6 @@
               <a:t>Covid-19, a world pandemic which broke out in late 2019 brought significant changes to the world. Despite its direct impact on sickness and mental health around the world, its effect was also felt on suicide rate. </a:t>
             </a:r>
           </a:p>
-          <a:p>
-            <a:r>
-              <a:rPr lang="en-US" dirty="0"/>
-              <a:t>The goal of this project is to examine the impact of Covid-19 on suicide rate.</a:t>
-            </a:r>
-          </a:p>
         </p:txBody>
       </p:sp>
     </p:spTree>
@@ -4301,7 +4349,7 @@
           <p:cNvPr id="2" name="Title 1">
             <a:extLst>
               <a:ext uri="{FF2B5EF4-FFF2-40B4-BE49-F238E27FC236}">
-                <a16:creationId xmlns:a16="http://schemas.microsoft.com/office/drawing/2014/main" id="{BF623E2C-D3BB-A86F-8DD2-D5462BA98518}"/>
+                <a16:creationId xmlns:a16="http://schemas.microsoft.com/office/drawing/2014/main" id="{71C7B195-9FDB-9E84-DAAB-0181262BB776}"/>
               </a:ext>
             </a:extLst>
           </p:cNvPr>
@@ -4318,114 +4366,64 @@
           <a:lstStyle/>
           <a:p>
             <a:r>
-              <a:rPr lang="en-US"/>
-              <a:t>Data Source</a:t>
+              <a:rPr lang="en-US" dirty="0"/>
+              <a:t>Scope</a:t>
+            </a:r>
+          </a:p>
+        </p:txBody>
+      </p:sp>
+      <p:sp>
+        <p:nvSpPr>
+          <p:cNvPr id="3" name="Content Placeholder 2">
+            <a:extLst>
+              <a:ext uri="{FF2B5EF4-FFF2-40B4-BE49-F238E27FC236}">
+                <a16:creationId xmlns:a16="http://schemas.microsoft.com/office/drawing/2014/main" id="{5ED0E091-A785-C9D3-DFF2-80E157D5AD14}"/>
+              </a:ext>
+            </a:extLst>
+          </p:cNvPr>
+          <p:cNvSpPr>
+            <a:spLocks noGrp="1"/>
+          </p:cNvSpPr>
+          <p:nvPr>
+            <p:ph idx="1"/>
+          </p:nvPr>
+        </p:nvSpPr>
+        <p:spPr/>
+        <p:txBody>
+          <a:bodyPr/>
+          <a:lstStyle/>
+          <a:p>
+            <a:r>
+              <a:rPr lang="en-US" dirty="0"/>
+              <a:t>The goal of this project is:</a:t>
+            </a:r>
+          </a:p>
+          <a:p>
+            <a:r>
+              <a:rPr lang="en-US" dirty="0"/>
+              <a:t> To examine the impact of Covid-19 on suicide rate. The task includes gathering information on global suicide rate and recorded Covid-19 cases.</a:t>
+            </a:r>
+          </a:p>
+          <a:p>
+            <a:r>
+              <a:rPr lang="en-US" dirty="0"/>
+              <a:t>The information will be broken down using different strategies to identify and point out </a:t>
+            </a:r>
+            <a:r>
+              <a:rPr lang="en-US"/>
+              <a:t>any patterns.</a:t>
             </a:r>
             <a:endParaRPr lang="en-US" dirty="0"/>
           </a:p>
-        </p:txBody>
-      </p:sp>
-      <p:sp>
-        <p:nvSpPr>
-          <p:cNvPr id="3" name="Content Placeholder 2">
-            <a:extLst>
-              <a:ext uri="{FF2B5EF4-FFF2-40B4-BE49-F238E27FC236}">
-                <a16:creationId xmlns:a16="http://schemas.microsoft.com/office/drawing/2014/main" id="{174B23E1-F95D-EEFA-B87A-1600B579DD88}"/>
-              </a:ext>
-            </a:extLst>
-          </p:cNvPr>
-          <p:cNvSpPr>
-            <a:spLocks noGrp="1"/>
-          </p:cNvSpPr>
-          <p:nvPr>
-            <p:ph idx="1"/>
-          </p:nvPr>
-        </p:nvSpPr>
-        <p:spPr/>
-        <p:txBody>
-          <a:bodyPr/>
-          <a:lstStyle/>
-          <a:p>
-            <a:r>
-              <a:rPr lang="en-US" dirty="0"/>
-              <a:t>Data was pulled form the following sources to capture suicidal trends as impacted by Covid-19.</a:t>
-            </a:r>
-          </a:p>
-          <a:p>
-            <a:pPr>
-              <a:buFontTx/>
-              <a:buChar char="-"/>
-            </a:pPr>
-            <a:r>
-              <a:rPr lang="en-US" dirty="0"/>
-              <a:t>Name of website(Website </a:t>
-            </a:r>
-            <a:r>
-              <a:rPr lang="en-US" dirty="0" err="1"/>
-              <a:t>url</a:t>
-            </a:r>
-            <a:r>
-              <a:rPr lang="en-US" dirty="0"/>
-              <a:t>) </a:t>
-            </a:r>
-          </a:p>
-          <a:p>
-            <a:pPr>
-              <a:buFontTx/>
-              <a:buChar char="-"/>
-            </a:pPr>
-            <a:r>
-              <a:rPr lang="en-US" dirty="0"/>
-              <a:t>Name of website(Website </a:t>
-            </a:r>
-            <a:r>
-              <a:rPr lang="en-US" dirty="0" err="1"/>
-              <a:t>url</a:t>
-            </a:r>
-            <a:r>
-              <a:rPr lang="en-US" dirty="0"/>
-              <a:t>)</a:t>
-            </a:r>
-          </a:p>
-          <a:p>
-            <a:pPr>
-              <a:buFontTx/>
-              <a:buChar char="-"/>
-            </a:pPr>
-            <a:r>
-              <a:rPr lang="en-US" dirty="0"/>
-              <a:t>World Bank (www.worldbank.org)</a:t>
-            </a:r>
-          </a:p>
-          <a:p>
-            <a:pPr>
-              <a:buFontTx/>
-              <a:buChar char="-"/>
-            </a:pPr>
+          <a:p>
             <a:endParaRPr lang="en-US" dirty="0"/>
-          </a:p>
-          <a:p>
-            <a:r>
-              <a:rPr lang="en-US" dirty="0"/>
-              <a:t>API</a:t>
-            </a:r>
-          </a:p>
-          <a:p>
-            <a:pPr>
-              <a:buFontTx/>
-              <a:buChar char="-"/>
-            </a:pPr>
-            <a:r>
-              <a:rPr lang="en-US" dirty="0"/>
-              <a:t>http://api.worldbank.org/v2</a:t>
-            </a:r>
           </a:p>
         </p:txBody>
       </p:sp>
     </p:spTree>
     <p:extLst>
       <p:ext uri="{BB962C8B-B14F-4D97-AF65-F5344CB8AC3E}">
-        <p14:creationId xmlns:p14="http://schemas.microsoft.com/office/powerpoint/2010/main" val="677050436"/>
+        <p14:creationId xmlns:p14="http://schemas.microsoft.com/office/powerpoint/2010/main" val="2506259767"/>
       </p:ext>
     </p:extLst>
   </p:cSld>
@@ -4457,6 +4455,162 @@
           <p:cNvPr id="2" name="Title 1">
             <a:extLst>
               <a:ext uri="{FF2B5EF4-FFF2-40B4-BE49-F238E27FC236}">
+                <a16:creationId xmlns:a16="http://schemas.microsoft.com/office/drawing/2014/main" id="{BF623E2C-D3BB-A86F-8DD2-D5462BA98518}"/>
+              </a:ext>
+            </a:extLst>
+          </p:cNvPr>
+          <p:cNvSpPr>
+            <a:spLocks noGrp="1"/>
+          </p:cNvSpPr>
+          <p:nvPr>
+            <p:ph type="title"/>
+          </p:nvPr>
+        </p:nvSpPr>
+        <p:spPr/>
+        <p:txBody>
+          <a:bodyPr/>
+          <a:lstStyle/>
+          <a:p>
+            <a:r>
+              <a:rPr lang="en-US"/>
+              <a:t>Data Source</a:t>
+            </a:r>
+            <a:endParaRPr lang="en-US" dirty="0"/>
+          </a:p>
+        </p:txBody>
+      </p:sp>
+      <p:sp>
+        <p:nvSpPr>
+          <p:cNvPr id="3" name="Content Placeholder 2">
+            <a:extLst>
+              <a:ext uri="{FF2B5EF4-FFF2-40B4-BE49-F238E27FC236}">
+                <a16:creationId xmlns:a16="http://schemas.microsoft.com/office/drawing/2014/main" id="{174B23E1-F95D-EEFA-B87A-1600B579DD88}"/>
+              </a:ext>
+            </a:extLst>
+          </p:cNvPr>
+          <p:cNvSpPr>
+            <a:spLocks noGrp="1"/>
+          </p:cNvSpPr>
+          <p:nvPr>
+            <p:ph idx="1"/>
+          </p:nvPr>
+        </p:nvSpPr>
+        <p:spPr/>
+        <p:txBody>
+          <a:bodyPr/>
+          <a:lstStyle/>
+          <a:p>
+            <a:r>
+              <a:rPr lang="en-US" dirty="0"/>
+              <a:t>Data was pulled form the following sources to capture suicidal trends as impacted by Covid-19.</a:t>
+            </a:r>
+          </a:p>
+          <a:p>
+            <a:pPr>
+              <a:buFontTx/>
+              <a:buChar char="-"/>
+            </a:pPr>
+            <a:r>
+              <a:rPr lang="en-US" dirty="0"/>
+              <a:t>Name of website(Website </a:t>
+            </a:r>
+            <a:r>
+              <a:rPr lang="en-US" dirty="0" err="1"/>
+              <a:t>url</a:t>
+            </a:r>
+            <a:r>
+              <a:rPr lang="en-US" dirty="0"/>
+              <a:t>) </a:t>
+            </a:r>
+          </a:p>
+          <a:p>
+            <a:pPr>
+              <a:buFontTx/>
+              <a:buChar char="-"/>
+            </a:pPr>
+            <a:r>
+              <a:rPr lang="en-US" dirty="0"/>
+              <a:t>Name of website(Website </a:t>
+            </a:r>
+            <a:r>
+              <a:rPr lang="en-US" dirty="0" err="1"/>
+              <a:t>url</a:t>
+            </a:r>
+            <a:r>
+              <a:rPr lang="en-US" dirty="0"/>
+              <a:t>)</a:t>
+            </a:r>
+          </a:p>
+          <a:p>
+            <a:pPr>
+              <a:buFontTx/>
+              <a:buChar char="-"/>
+            </a:pPr>
+            <a:r>
+              <a:rPr lang="en-US" dirty="0"/>
+              <a:t>World Bank (www.worldbank.org)</a:t>
+            </a:r>
+          </a:p>
+          <a:p>
+            <a:pPr>
+              <a:buFontTx/>
+              <a:buChar char="-"/>
+            </a:pPr>
+            <a:endParaRPr lang="en-US" dirty="0"/>
+          </a:p>
+          <a:p>
+            <a:r>
+              <a:rPr lang="en-US" dirty="0"/>
+              <a:t>API</a:t>
+            </a:r>
+          </a:p>
+          <a:p>
+            <a:pPr>
+              <a:buFontTx/>
+              <a:buChar char="-"/>
+            </a:pPr>
+            <a:r>
+              <a:rPr lang="en-US" dirty="0"/>
+              <a:t>http://api.worldbank.org/v2</a:t>
+            </a:r>
+          </a:p>
+        </p:txBody>
+      </p:sp>
+    </p:spTree>
+    <p:extLst>
+      <p:ext uri="{BB962C8B-B14F-4D97-AF65-F5344CB8AC3E}">
+        <p14:creationId xmlns:p14="http://schemas.microsoft.com/office/powerpoint/2010/main" val="677050436"/>
+      </p:ext>
+    </p:extLst>
+  </p:cSld>
+  <p:clrMapOvr>
+    <a:masterClrMapping/>
+  </p:clrMapOvr>
+</p:sld>
+</file>
+
+<file path=ppt/slides/slide5.xml><?xml version="1.0" encoding="utf-8"?>
+<p:sld xmlns:a="http://schemas.openxmlformats.org/drawingml/2006/main" xmlns:r="http://schemas.openxmlformats.org/officeDocument/2006/relationships" xmlns:p="http://schemas.openxmlformats.org/presentationml/2006/main">
+  <p:cSld>
+    <p:spTree>
+      <p:nvGrpSpPr>
+        <p:cNvPr id="1" name=""/>
+        <p:cNvGrpSpPr/>
+        <p:nvPr/>
+      </p:nvGrpSpPr>
+      <p:grpSpPr>
+        <a:xfrm>
+          <a:off x="0" y="0"/>
+          <a:ext cx="0" cy="0"/>
+          <a:chOff x="0" y="0"/>
+          <a:chExt cx="0" cy="0"/>
+        </a:xfrm>
+      </p:grpSpPr>
+      <p:sp>
+        <p:nvSpPr>
+          <p:cNvPr id="2" name="Title 1">
+            <a:extLst>
+              <a:ext uri="{FF2B5EF4-FFF2-40B4-BE49-F238E27FC236}">
                 <a16:creationId xmlns:a16="http://schemas.microsoft.com/office/drawing/2014/main" id="{1E5EF0FE-B51E-2719-D339-C06D73AA931F}"/>
               </a:ext>
             </a:extLst>
@@ -4573,7 +4727,7 @@
 </p:sld>
 </file>
 
-<file path=ppt/slides/slide5.xml><?xml version="1.0" encoding="utf-8"?>
+<file path=ppt/slides/slide6.xml><?xml version="1.0" encoding="utf-8"?>
 <p:sld xmlns:a="http://schemas.openxmlformats.org/drawingml/2006/main" xmlns:r="http://schemas.openxmlformats.org/officeDocument/2006/relationships" xmlns:p="http://schemas.openxmlformats.org/presentationml/2006/main">
   <p:cSld>
     <p:spTree>
@@ -4691,7 +4845,7 @@
 </p:sld>
 </file>
 
-<file path=ppt/slides/slide6.xml><?xml version="1.0" encoding="utf-8"?>
+<file path=ppt/slides/slide7.xml><?xml version="1.0" encoding="utf-8"?>
 <p:sld xmlns:a="http://schemas.openxmlformats.org/drawingml/2006/main" xmlns:r="http://schemas.openxmlformats.org/officeDocument/2006/relationships" xmlns:p="http://schemas.openxmlformats.org/presentationml/2006/main">
   <p:cSld>
     <p:spTree>

</xml_diff>

<commit_message>
Plotted the title and labels on the US suicide rate chart, modified PPT
</commit_message>
<xml_diff>
--- a/Project 1 PPT.pptx
+++ b/Project 1 PPT.pptx
@@ -9,9 +9,11 @@
     <p:sldId id="257" r:id="rId3"/>
     <p:sldId id="262" r:id="rId4"/>
     <p:sldId id="258" r:id="rId5"/>
-    <p:sldId id="259" r:id="rId6"/>
-    <p:sldId id="260" r:id="rId7"/>
-    <p:sldId id="261" r:id="rId8"/>
+    <p:sldId id="263" r:id="rId6"/>
+    <p:sldId id="259" r:id="rId7"/>
+    <p:sldId id="260" r:id="rId8"/>
+    <p:sldId id="261" r:id="rId9"/>
+    <p:sldId id="264" r:id="rId10"/>
   </p:sldIdLst>
   <p:sldSz cx="12192000" cy="6858000"/>
   <p:notesSz cx="6858000" cy="9144000"/>
@@ -118,12 +120,20 @@
 </p:presentation>
 </file>
 
+<file path=ppt/revisionInfo.xml><?xml version="1.0" encoding="utf-8"?>
+<p1510:revInfo xmlns:a="http://schemas.openxmlformats.org/drawingml/2006/main" xmlns:r="http://schemas.openxmlformats.org/officeDocument/2006/relationships" xmlns:p1510="http://schemas.microsoft.com/office/powerpoint/2015/10/main">
+  <p1510:revLst>
+    <p1510:client id="{EE5D1454-DE28-4F36-8880-5666914C2813}" v="3" dt="2023-05-02T08:30:15.303"/>
+  </p1510:revLst>
+</p1510:revInfo>
+</file>
+
 <file path=ppt/changesInfos/changesInfo1.xml><?xml version="1.0" encoding="utf-8"?>
 <pc:chgInfo xmlns:a="http://schemas.openxmlformats.org/drawingml/2006/main" xmlns:r="http://schemas.openxmlformats.org/officeDocument/2006/relationships" xmlns:ac="http://schemas.microsoft.com/office/drawing/2013/main/command" xmlns:pc="http://schemas.microsoft.com/office/powerpoint/2013/main/command">
   <pc:docChgLst>
     <pc:chgData name="Stan Ejiobi" userId="bfdee1cc2c219db3" providerId="LiveId" clId="{EE5D1454-DE28-4F36-8880-5666914C2813}"/>
-    <pc:docChg chg="undo custSel addSld modSld">
-      <pc:chgData name="Stan Ejiobi" userId="bfdee1cc2c219db3" providerId="LiveId" clId="{EE5D1454-DE28-4F36-8880-5666914C2813}" dt="2023-05-02T02:44:08.409" v="563" actId="20577"/>
+    <pc:docChg chg="undo custSel addSld modSld sldOrd">
+      <pc:chgData name="Stan Ejiobi" userId="bfdee1cc2c219db3" providerId="LiveId" clId="{EE5D1454-DE28-4F36-8880-5666914C2813}" dt="2023-05-02T09:02:30.564" v="1898" actId="27636"/>
       <pc:docMkLst>
         <pc:docMk/>
       </pc:docMkLst>
@@ -692,19 +702,27 @@
         </pc:graphicFrameChg>
       </pc:sldChg>
       <pc:sldChg chg="addSp delSp modSp mod setBg">
-        <pc:chgData name="Stan Ejiobi" userId="bfdee1cc2c219db3" providerId="LiveId" clId="{EE5D1454-DE28-4F36-8880-5666914C2813}" dt="2023-04-29T15:11:18.445" v="142" actId="14100"/>
+        <pc:chgData name="Stan Ejiobi" userId="bfdee1cc2c219db3" providerId="LiveId" clId="{EE5D1454-DE28-4F36-8880-5666914C2813}" dt="2023-05-02T08:54:07.190" v="1756" actId="20577"/>
         <pc:sldMkLst>
           <pc:docMk/>
           <pc:sldMk cId="3799763869" sldId="260"/>
         </pc:sldMkLst>
         <pc:spChg chg="mod">
-          <ac:chgData name="Stan Ejiobi" userId="bfdee1cc2c219db3" providerId="LiveId" clId="{EE5D1454-DE28-4F36-8880-5666914C2813}" dt="2023-04-29T15:10:19.907" v="140" actId="26606"/>
+          <ac:chgData name="Stan Ejiobi" userId="bfdee1cc2c219db3" providerId="LiveId" clId="{EE5D1454-DE28-4F36-8880-5666914C2813}" dt="2023-05-02T08:50:04.784" v="1726" actId="20577"/>
           <ac:spMkLst>
             <pc:docMk/>
             <pc:sldMk cId="3799763869" sldId="260"/>
             <ac:spMk id="2" creationId="{BDC38D4A-892F-8A49-ADD8-26F17924D33F}"/>
           </ac:spMkLst>
         </pc:spChg>
+        <pc:spChg chg="add mod">
+          <ac:chgData name="Stan Ejiobi" userId="bfdee1cc2c219db3" providerId="LiveId" clId="{EE5D1454-DE28-4F36-8880-5666914C2813}" dt="2023-05-02T08:54:07.190" v="1756" actId="20577"/>
+          <ac:spMkLst>
+            <pc:docMk/>
+            <pc:sldMk cId="3799763869" sldId="260"/>
+            <ac:spMk id="4" creationId="{39BC6378-DC6A-8E4F-9CD9-065CF6B37E02}"/>
+          </ac:spMkLst>
+        </pc:spChg>
         <pc:spChg chg="del">
           <ac:chgData name="Stan Ejiobi" userId="bfdee1cc2c219db3" providerId="LiveId" clId="{EE5D1454-DE28-4F36-8880-5666914C2813}" dt="2023-04-29T14:44:05.480" v="0" actId="22"/>
           <ac:spMkLst>
@@ -753,16 +771,16 @@
             <ac:spMk id="28" creationId="{DC701763-729E-462F-A5A8-E0DEFEB1E2E4}"/>
           </ac:spMkLst>
         </pc:spChg>
-        <pc:picChg chg="add mod ord">
-          <ac:chgData name="Stan Ejiobi" userId="bfdee1cc2c219db3" providerId="LiveId" clId="{EE5D1454-DE28-4F36-8880-5666914C2813}" dt="2023-04-29T15:11:14.018" v="141" actId="14100"/>
+        <pc:picChg chg="add del mod ord">
+          <ac:chgData name="Stan Ejiobi" userId="bfdee1cc2c219db3" providerId="LiveId" clId="{EE5D1454-DE28-4F36-8880-5666914C2813}" dt="2023-05-02T08:25:51.846" v="564" actId="478"/>
           <ac:picMkLst>
             <pc:docMk/>
             <pc:sldMk cId="3799763869" sldId="260"/>
             <ac:picMk id="13" creationId="{1D1E192F-57E6-6A5A-2515-D2184BA85D9C}"/>
           </ac:picMkLst>
         </pc:picChg>
-        <pc:picChg chg="add mod">
-          <ac:chgData name="Stan Ejiobi" userId="bfdee1cc2c219db3" providerId="LiveId" clId="{EE5D1454-DE28-4F36-8880-5666914C2813}" dt="2023-04-29T15:11:18.445" v="142" actId="14100"/>
+        <pc:picChg chg="add del mod">
+          <ac:chgData name="Stan Ejiobi" userId="bfdee1cc2c219db3" providerId="LiveId" clId="{EE5D1454-DE28-4F36-8880-5666914C2813}" dt="2023-05-02T08:25:55.017" v="565" actId="478"/>
           <ac:picMkLst>
             <pc:docMk/>
             <pc:sldMk cId="3799763869" sldId="260"/>
@@ -779,13 +797,13 @@
         </pc:picChg>
       </pc:sldChg>
       <pc:sldChg chg="addSp delSp modSp new mod setBg">
-        <pc:chgData name="Stan Ejiobi" userId="bfdee1cc2c219db3" providerId="LiveId" clId="{EE5D1454-DE28-4F36-8880-5666914C2813}" dt="2023-04-29T15:09:58.081" v="129" actId="26606"/>
+        <pc:chgData name="Stan Ejiobi" userId="bfdee1cc2c219db3" providerId="LiveId" clId="{EE5D1454-DE28-4F36-8880-5666914C2813}" dt="2023-05-02T09:00:16.410" v="1839" actId="113"/>
         <pc:sldMkLst>
           <pc:docMk/>
           <pc:sldMk cId="1504725780" sldId="261"/>
         </pc:sldMkLst>
         <pc:spChg chg="mod">
-          <ac:chgData name="Stan Ejiobi" userId="bfdee1cc2c219db3" providerId="LiveId" clId="{EE5D1454-DE28-4F36-8880-5666914C2813}" dt="2023-04-29T15:09:58.081" v="129" actId="26606"/>
+          <ac:chgData name="Stan Ejiobi" userId="bfdee1cc2c219db3" providerId="LiveId" clId="{EE5D1454-DE28-4F36-8880-5666914C2813}" dt="2023-05-02T09:00:16.410" v="1839" actId="113"/>
           <ac:spMkLst>
             <pc:docMk/>
             <pc:sldMk cId="1504725780" sldId="261"/>
@@ -800,6 +818,22 @@
             <ac:spMk id="3" creationId="{2BA8D287-3CE9-D837-1993-438A98CCDC75}"/>
           </ac:spMkLst>
         </pc:spChg>
+        <pc:spChg chg="add del mod">
+          <ac:chgData name="Stan Ejiobi" userId="bfdee1cc2c219db3" providerId="LiveId" clId="{EE5D1454-DE28-4F36-8880-5666914C2813}" dt="2023-05-02T08:28:14.565" v="568" actId="22"/>
+          <ac:spMkLst>
+            <pc:docMk/>
+            <pc:sldMk cId="1504725780" sldId="261"/>
+            <ac:spMk id="4" creationId="{655292B1-5471-098F-4CF9-886EC0CBBD9D}"/>
+          </ac:spMkLst>
+        </pc:spChg>
+        <pc:spChg chg="add del mod">
+          <ac:chgData name="Stan Ejiobi" userId="bfdee1cc2c219db3" providerId="LiveId" clId="{EE5D1454-DE28-4F36-8880-5666914C2813}" dt="2023-05-02T08:28:18.727" v="570" actId="22"/>
+          <ac:spMkLst>
+            <pc:docMk/>
+            <pc:sldMk cId="1504725780" sldId="261"/>
+            <ac:spMk id="10" creationId="{CD330121-7D43-AF49-3F5A-A8686A92E291}"/>
+          </ac:spMkLst>
+        </pc:spChg>
         <pc:spChg chg="add del">
           <ac:chgData name="Stan Ejiobi" userId="bfdee1cc2c219db3" providerId="LiveId" clId="{EE5D1454-DE28-4F36-8880-5666914C2813}" dt="2023-04-29T15:09:58.081" v="129" actId="26606"/>
           <ac:spMkLst>
@@ -808,6 +842,14 @@
             <ac:spMk id="12" creationId="{2151139A-886F-4B97-8815-729AD3831BBD}"/>
           </ac:spMkLst>
         </pc:spChg>
+        <pc:spChg chg="add mod">
+          <ac:chgData name="Stan Ejiobi" userId="bfdee1cc2c219db3" providerId="LiveId" clId="{EE5D1454-DE28-4F36-8880-5666914C2813}" dt="2023-05-02T08:29:30.315" v="581" actId="20577"/>
+          <ac:spMkLst>
+            <pc:docMk/>
+            <pc:sldMk cId="1504725780" sldId="261"/>
+            <ac:spMk id="13" creationId="{0EFC1818-5B22-3081-D6E9-F2C37E708337}"/>
+          </ac:spMkLst>
+        </pc:spChg>
         <pc:spChg chg="add del">
           <ac:chgData name="Stan Ejiobi" userId="bfdee1cc2c219db3" providerId="LiveId" clId="{EE5D1454-DE28-4F36-8880-5666914C2813}" dt="2023-04-29T15:09:58.081" v="129" actId="26606"/>
           <ac:spMkLst>
@@ -816,6 +858,22 @@
             <ac:spMk id="14" creationId="{5428AC11-BFDF-42EF-80FF-717BBF909067}"/>
           </ac:spMkLst>
         </pc:spChg>
+        <pc:spChg chg="add mod">
+          <ac:chgData name="Stan Ejiobi" userId="bfdee1cc2c219db3" providerId="LiveId" clId="{EE5D1454-DE28-4F36-8880-5666914C2813}" dt="2023-05-02T08:30:00.190" v="601" actId="20577"/>
+          <ac:spMkLst>
+            <pc:docMk/>
+            <pc:sldMk cId="1504725780" sldId="261"/>
+            <ac:spMk id="14" creationId="{D55043FD-4633-30B3-DB24-FCE733C0413D}"/>
+          </ac:spMkLst>
+        </pc:spChg>
+        <pc:spChg chg="add mod">
+          <ac:chgData name="Stan Ejiobi" userId="bfdee1cc2c219db3" providerId="LiveId" clId="{EE5D1454-DE28-4F36-8880-5666914C2813}" dt="2023-05-02T08:58:13.472" v="1831" actId="20577"/>
+          <ac:spMkLst>
+            <pc:docMk/>
+            <pc:sldMk cId="1504725780" sldId="261"/>
+            <ac:spMk id="15" creationId="{C9431CF1-78A0-80FF-30F3-0E3BA5CB4436}"/>
+          </ac:spMkLst>
+        </pc:spChg>
         <pc:spChg chg="add del">
           <ac:chgData name="Stan Ejiobi" userId="bfdee1cc2c219db3" providerId="LiveId" clId="{EE5D1454-DE28-4F36-8880-5666914C2813}" dt="2023-04-29T15:09:58.081" v="129" actId="26606"/>
           <ac:spMkLst>
@@ -832,20 +890,44 @@
             <ac:spMk id="18" creationId="{32FD26B0-16CE-4AD4-9CE4-A63EBF330831}"/>
           </ac:spMkLst>
         </pc:spChg>
-        <pc:picChg chg="add mod ord">
-          <ac:chgData name="Stan Ejiobi" userId="bfdee1cc2c219db3" providerId="LiveId" clId="{EE5D1454-DE28-4F36-8880-5666914C2813}" dt="2023-04-29T15:09:58.081" v="129" actId="26606"/>
+        <pc:picChg chg="add del mod ord">
+          <ac:chgData name="Stan Ejiobi" userId="bfdee1cc2c219db3" providerId="LiveId" clId="{EE5D1454-DE28-4F36-8880-5666914C2813}" dt="2023-05-02T08:26:03.033" v="567" actId="478"/>
           <ac:picMkLst>
             <pc:docMk/>
             <pc:sldMk cId="1504725780" sldId="261"/>
             <ac:picMk id="5" creationId="{802CBA16-0F80-29D4-F423-607853611BA7}"/>
           </ac:picMkLst>
         </pc:picChg>
-        <pc:picChg chg="add mod ord">
-          <ac:chgData name="Stan Ejiobi" userId="bfdee1cc2c219db3" providerId="LiveId" clId="{EE5D1454-DE28-4F36-8880-5666914C2813}" dt="2023-04-29T15:09:58.081" v="129" actId="26606"/>
+        <pc:picChg chg="add del mod ord">
+          <ac:chgData name="Stan Ejiobi" userId="bfdee1cc2c219db3" providerId="LiveId" clId="{EE5D1454-DE28-4F36-8880-5666914C2813}" dt="2023-05-02T08:25:59.667" v="566" actId="478"/>
           <ac:picMkLst>
             <pc:docMk/>
             <pc:sldMk cId="1504725780" sldId="261"/>
             <ac:picMk id="7" creationId="{20D9B4CA-94AD-91D8-D3A2-BD291823D496}"/>
+          </ac:picMkLst>
+        </pc:picChg>
+        <pc:picChg chg="add del mod ord">
+          <ac:chgData name="Stan Ejiobi" userId="bfdee1cc2c219db3" providerId="LiveId" clId="{EE5D1454-DE28-4F36-8880-5666914C2813}" dt="2023-05-02T08:28:16.626" v="569" actId="478"/>
+          <ac:picMkLst>
+            <pc:docMk/>
+            <pc:sldMk cId="1504725780" sldId="261"/>
+            <ac:picMk id="8" creationId="{F43EFFDB-9F54-2C14-48D2-03EB5386714A}"/>
+          </ac:picMkLst>
+        </pc:picChg>
+        <pc:picChg chg="add mod ord">
+          <ac:chgData name="Stan Ejiobi" userId="bfdee1cc2c219db3" providerId="LiveId" clId="{EE5D1454-DE28-4F36-8880-5666914C2813}" dt="2023-05-02T08:57:20.734" v="1827" actId="14100"/>
+          <ac:picMkLst>
+            <pc:docMk/>
+            <pc:sldMk cId="1504725780" sldId="261"/>
+            <ac:picMk id="12" creationId="{5016057F-407D-8D68-E2E2-760684F661E8}"/>
+          </ac:picMkLst>
+        </pc:picChg>
+        <pc:picChg chg="add mod">
+          <ac:chgData name="Stan Ejiobi" userId="bfdee1cc2c219db3" providerId="LiveId" clId="{EE5D1454-DE28-4F36-8880-5666914C2813}" dt="2023-05-02T08:58:57.872" v="1833" actId="14100"/>
+          <ac:picMkLst>
+            <pc:docMk/>
+            <pc:sldMk cId="1504725780" sldId="261"/>
+            <ac:picMk id="17" creationId="{FBF5E5D7-17AC-2B29-2F13-6F86A367054A}"/>
           </ac:picMkLst>
         </pc:picChg>
       </pc:sldChg>
@@ -869,6 +951,44 @@
             <pc:docMk/>
             <pc:sldMk cId="2506259767" sldId="262"/>
             <ac:spMk id="3" creationId="{5ED0E091-A785-C9D3-DFF2-80E157D5AD14}"/>
+          </ac:spMkLst>
+        </pc:spChg>
+      </pc:sldChg>
+      <pc:sldChg chg="modSp new mod ord">
+        <pc:chgData name="Stan Ejiobi" userId="bfdee1cc2c219db3" providerId="LiveId" clId="{EE5D1454-DE28-4F36-8880-5666914C2813}" dt="2023-05-02T08:41:09.155" v="1390" actId="20577"/>
+        <pc:sldMkLst>
+          <pc:docMk/>
+          <pc:sldMk cId="2050926516" sldId="263"/>
+        </pc:sldMkLst>
+        <pc:spChg chg="mod">
+          <ac:chgData name="Stan Ejiobi" userId="bfdee1cc2c219db3" providerId="LiveId" clId="{EE5D1454-DE28-4F36-8880-5666914C2813}" dt="2023-05-02T08:35:52.615" v="1012" actId="20577"/>
+          <ac:spMkLst>
+            <pc:docMk/>
+            <pc:sldMk cId="2050926516" sldId="263"/>
+            <ac:spMk id="2" creationId="{CEA8C31F-DB9D-F3E5-0390-DA62AB4C43CD}"/>
+          </ac:spMkLst>
+        </pc:spChg>
+        <pc:spChg chg="mod">
+          <ac:chgData name="Stan Ejiobi" userId="bfdee1cc2c219db3" providerId="LiveId" clId="{EE5D1454-DE28-4F36-8880-5666914C2813}" dt="2023-05-02T08:41:09.155" v="1390" actId="20577"/>
+          <ac:spMkLst>
+            <pc:docMk/>
+            <pc:sldMk cId="2050926516" sldId="263"/>
+            <ac:spMk id="3" creationId="{5B1B95A1-2772-F872-B3F5-362CB7E37704}"/>
+          </ac:spMkLst>
+        </pc:spChg>
+      </pc:sldChg>
+      <pc:sldChg chg="modSp new mod">
+        <pc:chgData name="Stan Ejiobi" userId="bfdee1cc2c219db3" providerId="LiveId" clId="{EE5D1454-DE28-4F36-8880-5666914C2813}" dt="2023-05-02T09:02:30.564" v="1898" actId="27636"/>
+        <pc:sldMkLst>
+          <pc:docMk/>
+          <pc:sldMk cId="2273328587" sldId="264"/>
+        </pc:sldMkLst>
+        <pc:spChg chg="mod">
+          <ac:chgData name="Stan Ejiobi" userId="bfdee1cc2c219db3" providerId="LiveId" clId="{EE5D1454-DE28-4F36-8880-5666914C2813}" dt="2023-05-02T09:02:30.564" v="1898" actId="27636"/>
+          <ac:spMkLst>
+            <pc:docMk/>
+            <pc:sldMk cId="2273328587" sldId="264"/>
+            <ac:spMk id="2" creationId="{004F0F32-41F5-FC05-71FC-8A9473605462}"/>
           </ac:spMkLst>
         </pc:spChg>
       </pc:sldChg>
@@ -1024,7 +1144,7 @@
           <a:p>
             <a:fld id="{6A129023-3AF9-4412-A39D-F0BE5F885D2D}" type="datetimeFigureOut">
               <a:rPr lang="en-US" smtClean="0"/>
-              <a:t>5/1/2023</a:t>
+              <a:t>5/2/2023</a:t>
             </a:fld>
             <a:endParaRPr lang="en-US"/>
           </a:p>
@@ -1222,7 +1342,7 @@
           <a:p>
             <a:fld id="{6A129023-3AF9-4412-A39D-F0BE5F885D2D}" type="datetimeFigureOut">
               <a:rPr lang="en-US" smtClean="0"/>
-              <a:t>5/1/2023</a:t>
+              <a:t>5/2/2023</a:t>
             </a:fld>
             <a:endParaRPr lang="en-US"/>
           </a:p>
@@ -1430,7 +1550,7 @@
           <a:p>
             <a:fld id="{6A129023-3AF9-4412-A39D-F0BE5F885D2D}" type="datetimeFigureOut">
               <a:rPr lang="en-US" smtClean="0"/>
-              <a:t>5/1/2023</a:t>
+              <a:t>5/2/2023</a:t>
             </a:fld>
             <a:endParaRPr lang="en-US"/>
           </a:p>
@@ -1628,7 +1748,7 @@
           <a:p>
             <a:fld id="{6A129023-3AF9-4412-A39D-F0BE5F885D2D}" type="datetimeFigureOut">
               <a:rPr lang="en-US" smtClean="0"/>
-              <a:t>5/1/2023</a:t>
+              <a:t>5/2/2023</a:t>
             </a:fld>
             <a:endParaRPr lang="en-US"/>
           </a:p>
@@ -1903,7 +2023,7 @@
           <a:p>
             <a:fld id="{6A129023-3AF9-4412-A39D-F0BE5F885D2D}" type="datetimeFigureOut">
               <a:rPr lang="en-US" smtClean="0"/>
-              <a:t>5/1/2023</a:t>
+              <a:t>5/2/2023</a:t>
             </a:fld>
             <a:endParaRPr lang="en-US"/>
           </a:p>
@@ -2168,7 +2288,7 @@
           <a:p>
             <a:fld id="{6A129023-3AF9-4412-A39D-F0BE5F885D2D}" type="datetimeFigureOut">
               <a:rPr lang="en-US" smtClean="0"/>
-              <a:t>5/1/2023</a:t>
+              <a:t>5/2/2023</a:t>
             </a:fld>
             <a:endParaRPr lang="en-US"/>
           </a:p>
@@ -2580,7 +2700,7 @@
           <a:p>
             <a:fld id="{6A129023-3AF9-4412-A39D-F0BE5F885D2D}" type="datetimeFigureOut">
               <a:rPr lang="en-US" smtClean="0"/>
-              <a:t>5/1/2023</a:t>
+              <a:t>5/2/2023</a:t>
             </a:fld>
             <a:endParaRPr lang="en-US"/>
           </a:p>
@@ -2721,7 +2841,7 @@
           <a:p>
             <a:fld id="{6A129023-3AF9-4412-A39D-F0BE5F885D2D}" type="datetimeFigureOut">
               <a:rPr lang="en-US" smtClean="0"/>
-              <a:t>5/1/2023</a:t>
+              <a:t>5/2/2023</a:t>
             </a:fld>
             <a:endParaRPr lang="en-US"/>
           </a:p>
@@ -2834,7 +2954,7 @@
           <a:p>
             <a:fld id="{6A129023-3AF9-4412-A39D-F0BE5F885D2D}" type="datetimeFigureOut">
               <a:rPr lang="en-US" smtClean="0"/>
-              <a:t>5/1/2023</a:t>
+              <a:t>5/2/2023</a:t>
             </a:fld>
             <a:endParaRPr lang="en-US"/>
           </a:p>
@@ -3145,7 +3265,7 @@
           <a:p>
             <a:fld id="{6A129023-3AF9-4412-A39D-F0BE5F885D2D}" type="datetimeFigureOut">
               <a:rPr lang="en-US" smtClean="0"/>
-              <a:t>5/1/2023</a:t>
+              <a:t>5/2/2023</a:t>
             </a:fld>
             <a:endParaRPr lang="en-US"/>
           </a:p>
@@ -3433,7 +3553,7 @@
           <a:p>
             <a:fld id="{6A129023-3AF9-4412-A39D-F0BE5F885D2D}" type="datetimeFigureOut">
               <a:rPr lang="en-US" smtClean="0"/>
-              <a:t>5/1/2023</a:t>
+              <a:t>5/2/2023</a:t>
             </a:fld>
             <a:endParaRPr lang="en-US"/>
           </a:p>
@@ -3674,7 +3794,7 @@
           <a:p>
             <a:fld id="{6A129023-3AF9-4412-A39D-F0BE5F885D2D}" type="datetimeFigureOut">
               <a:rPr lang="en-US" smtClean="0"/>
-              <a:t>5/1/2023</a:t>
+              <a:t>5/2/2023</a:t>
             </a:fld>
             <a:endParaRPr lang="en-US"/>
           </a:p>
@@ -4611,7 +4731,7 @@
           <p:cNvPr id="2" name="Title 1">
             <a:extLst>
               <a:ext uri="{FF2B5EF4-FFF2-40B4-BE49-F238E27FC236}">
-                <a16:creationId xmlns:a16="http://schemas.microsoft.com/office/drawing/2014/main" id="{1E5EF0FE-B51E-2719-D339-C06D73AA931F}"/>
+                <a16:creationId xmlns:a16="http://schemas.microsoft.com/office/drawing/2014/main" id="{CEA8C31F-DB9D-F3E5-0390-DA62AB4C43CD}"/>
               </a:ext>
             </a:extLst>
           </p:cNvPr>
@@ -4628,10 +4748,9 @@
           <a:lstStyle/>
           <a:p>
             <a:r>
-              <a:rPr lang="en-US"/>
-              <a:t>Observation</a:t>
-            </a:r>
-            <a:endParaRPr lang="en-US" dirty="0"/>
+              <a:rPr lang="en-US" dirty="0"/>
+              <a:t>Methods</a:t>
+            </a:r>
           </a:p>
         </p:txBody>
       </p:sp>
@@ -4640,7 +4759,7 @@
           <p:cNvPr id="3" name="Content Placeholder 2">
             <a:extLst>
               <a:ext uri="{FF2B5EF4-FFF2-40B4-BE49-F238E27FC236}">
-                <a16:creationId xmlns:a16="http://schemas.microsoft.com/office/drawing/2014/main" id="{B138997C-B6D9-A91D-0255-766EC8798D2D}"/>
+                <a16:creationId xmlns:a16="http://schemas.microsoft.com/office/drawing/2014/main" id="{5B1B95A1-2772-F872-B3F5-362CB7E37704}"/>
               </a:ext>
             </a:extLst>
           </p:cNvPr>
@@ -4658,58 +4777,47 @@
           <a:p>
             <a:r>
               <a:rPr lang="en-US" dirty="0"/>
-              <a:t>Name of website(Website </a:t>
-            </a:r>
-            <a:r>
-              <a:rPr lang="en-US" dirty="0" err="1"/>
-              <a:t>url</a:t>
-            </a:r>
+              <a:t>Data was pulled directly from 3 files containing suicide data dating back to the 1960s. </a:t>
+            </a:r>
+          </a:p>
+          <a:p>
+            <a:pPr>
+              <a:buFontTx/>
+              <a:buChar char="-"/>
+            </a:pPr>
             <a:r>
               <a:rPr lang="en-US" dirty="0"/>
-              <a:t>) showed that ……………</a:t>
-            </a:r>
-          </a:p>
-          <a:p>
-            <a:endParaRPr lang="en-US" dirty="0"/>
-          </a:p>
-          <a:p>
-            <a:endParaRPr lang="en-US" dirty="0"/>
-          </a:p>
-          <a:p>
+              <a:t>Imported to pandas</a:t>
+            </a:r>
+          </a:p>
+          <a:p>
+            <a:pPr>
+              <a:buFontTx/>
+              <a:buChar char="-"/>
+            </a:pPr>
             <a:r>
               <a:rPr lang="en-US" dirty="0"/>
-              <a:t>Name of website(Website </a:t>
-            </a:r>
-            <a:r>
-              <a:rPr lang="en-US" dirty="0" err="1"/>
-              <a:t>url</a:t>
-            </a:r>
+              <a:t>Cleaned</a:t>
+            </a:r>
+          </a:p>
+          <a:p>
+            <a:pPr>
+              <a:buFontTx/>
+              <a:buChar char="-"/>
+            </a:pPr>
             <a:r>
               <a:rPr lang="en-US" dirty="0"/>
-              <a:t>) showed that ……………</a:t>
-            </a:r>
-          </a:p>
-          <a:p>
-            <a:endParaRPr lang="en-US" dirty="0"/>
-          </a:p>
-          <a:p>
-            <a:pPr marL="0" indent="0">
-              <a:buNone/>
+              <a:t>Irrelevant columns dropped</a:t>
+            </a:r>
+          </a:p>
+          <a:p>
+            <a:pPr>
+              <a:buFontTx/>
+              <a:buChar char="-"/>
             </a:pPr>
-            <a:endParaRPr lang="en-US" dirty="0"/>
-          </a:p>
-          <a:p>
             <a:r>
               <a:rPr lang="en-US" dirty="0"/>
-              <a:t>Name of website(Website </a:t>
-            </a:r>
-            <a:r>
-              <a:rPr lang="en-US" dirty="0" err="1"/>
-              <a:t>url</a:t>
-            </a:r>
-            <a:r>
-              <a:rPr lang="en-US" dirty="0"/>
-              <a:t>) showed that ……………</a:t>
+              <a:t>Data frames created.</a:t>
             </a:r>
           </a:p>
         </p:txBody>
@@ -4717,7 +4825,7 @@
     </p:spTree>
     <p:extLst>
       <p:ext uri="{BB962C8B-B14F-4D97-AF65-F5344CB8AC3E}">
-        <p14:creationId xmlns:p14="http://schemas.microsoft.com/office/powerpoint/2010/main" val="185476636"/>
+        <p14:creationId xmlns:p14="http://schemas.microsoft.com/office/powerpoint/2010/main" val="2050926516"/>
       </p:ext>
     </p:extLst>
   </p:cSld>
@@ -4749,7 +4857,7 @@
           <p:cNvPr id="2" name="Title 1">
             <a:extLst>
               <a:ext uri="{FF2B5EF4-FFF2-40B4-BE49-F238E27FC236}">
-                <a16:creationId xmlns:a16="http://schemas.microsoft.com/office/drawing/2014/main" id="{BDC38D4A-892F-8A49-ADD8-26F17924D33F}"/>
+                <a16:creationId xmlns:a16="http://schemas.microsoft.com/office/drawing/2014/main" id="{1E5EF0FE-B51E-2719-D339-C06D73AA931F}"/>
               </a:ext>
             </a:extLst>
           </p:cNvPr>
@@ -4767,75 +4875,95 @@
           <a:p>
             <a:r>
               <a:rPr lang="en-US"/>
-              <a:t>Code</a:t>
+              <a:t>Observation</a:t>
             </a:r>
             <a:endParaRPr lang="en-US" dirty="0"/>
           </a:p>
         </p:txBody>
       </p:sp>
-      <p:pic>
-        <p:nvPicPr>
-          <p:cNvPr id="13" name="Content Placeholder 12">
-            <a:extLst>
-              <a:ext uri="{FF2B5EF4-FFF2-40B4-BE49-F238E27FC236}">
-                <a16:creationId xmlns:a16="http://schemas.microsoft.com/office/drawing/2014/main" id="{1D1E192F-57E6-6A5A-2515-D2184BA85D9C}"/>
-              </a:ext>
-            </a:extLst>
-          </p:cNvPr>
-          <p:cNvPicPr>
-            <a:picLocks noGrp="1" noChangeAspect="1"/>
-          </p:cNvPicPr>
+      <p:sp>
+        <p:nvSpPr>
+          <p:cNvPr id="3" name="Content Placeholder 2">
+            <a:extLst>
+              <a:ext uri="{FF2B5EF4-FFF2-40B4-BE49-F238E27FC236}">
+                <a16:creationId xmlns:a16="http://schemas.microsoft.com/office/drawing/2014/main" id="{B138997C-B6D9-A91D-0255-766EC8798D2D}"/>
+              </a:ext>
+            </a:extLst>
+          </p:cNvPr>
+          <p:cNvSpPr>
+            <a:spLocks noGrp="1"/>
+          </p:cNvSpPr>
           <p:nvPr>
             <p:ph idx="1"/>
           </p:nvPr>
-        </p:nvPicPr>
-        <p:blipFill>
-          <a:blip r:embed="rId2"/>
-          <a:stretch>
-            <a:fillRect/>
-          </a:stretch>
-        </p:blipFill>
-        <p:spPr>
-          <a:xfrm>
-            <a:off x="2117450" y="1264595"/>
-            <a:ext cx="4578317" cy="5349035"/>
-          </a:xfrm>
-        </p:spPr>
-      </p:pic>
-      <p:pic>
-        <p:nvPicPr>
-          <p:cNvPr id="15" name="Picture 14">
-            <a:extLst>
-              <a:ext uri="{FF2B5EF4-FFF2-40B4-BE49-F238E27FC236}">
-                <a16:creationId xmlns:a16="http://schemas.microsoft.com/office/drawing/2014/main" id="{8219F187-ADCB-E2D4-4A98-AB95711D8004}"/>
-              </a:ext>
-            </a:extLst>
-          </p:cNvPr>
-          <p:cNvPicPr>
-            <a:picLocks noChangeAspect="1"/>
-          </p:cNvPicPr>
-          <p:nvPr/>
-        </p:nvPicPr>
-        <p:blipFill>
-          <a:blip r:embed="rId3"/>
-          <a:stretch>
-            <a:fillRect/>
-          </a:stretch>
-        </p:blipFill>
-        <p:spPr>
-          <a:xfrm>
-            <a:off x="7416595" y="1326413"/>
-            <a:ext cx="4578317" cy="5349035"/>
-          </a:xfrm>
-          <a:prstGeom prst="rect">
-            <a:avLst/>
-          </a:prstGeom>
-        </p:spPr>
-      </p:pic>
+        </p:nvSpPr>
+        <p:spPr/>
+        <p:txBody>
+          <a:bodyPr/>
+          <a:lstStyle/>
+          <a:p>
+            <a:r>
+              <a:rPr lang="en-US" dirty="0"/>
+              <a:t>Name of website(Website </a:t>
+            </a:r>
+            <a:r>
+              <a:rPr lang="en-US" dirty="0" err="1"/>
+              <a:t>url</a:t>
+            </a:r>
+            <a:r>
+              <a:rPr lang="en-US" dirty="0"/>
+              <a:t>) showed that ……………</a:t>
+            </a:r>
+          </a:p>
+          <a:p>
+            <a:endParaRPr lang="en-US" dirty="0"/>
+          </a:p>
+          <a:p>
+            <a:endParaRPr lang="en-US" dirty="0"/>
+          </a:p>
+          <a:p>
+            <a:r>
+              <a:rPr lang="en-US" dirty="0"/>
+              <a:t>Name of website(Website </a:t>
+            </a:r>
+            <a:r>
+              <a:rPr lang="en-US" dirty="0" err="1"/>
+              <a:t>url</a:t>
+            </a:r>
+            <a:r>
+              <a:rPr lang="en-US" dirty="0"/>
+              <a:t>) showed that ……………</a:t>
+            </a:r>
+          </a:p>
+          <a:p>
+            <a:endParaRPr lang="en-US" dirty="0"/>
+          </a:p>
+          <a:p>
+            <a:pPr marL="0" indent="0">
+              <a:buNone/>
+            </a:pPr>
+            <a:endParaRPr lang="en-US" dirty="0"/>
+          </a:p>
+          <a:p>
+            <a:r>
+              <a:rPr lang="en-US" dirty="0"/>
+              <a:t>Name of website(Website </a:t>
+            </a:r>
+            <a:r>
+              <a:rPr lang="en-US" dirty="0" err="1"/>
+              <a:t>url</a:t>
+            </a:r>
+            <a:r>
+              <a:rPr lang="en-US" dirty="0"/>
+              <a:t>) showed that ……………</a:t>
+            </a:r>
+          </a:p>
+        </p:txBody>
+      </p:sp>
     </p:spTree>
     <p:extLst>
       <p:ext uri="{BB962C8B-B14F-4D97-AF65-F5344CB8AC3E}">
-        <p14:creationId xmlns:p14="http://schemas.microsoft.com/office/powerpoint/2010/main" val="3799763869"/>
+        <p14:creationId xmlns:p14="http://schemas.microsoft.com/office/powerpoint/2010/main" val="185476636"/>
       </p:ext>
     </p:extLst>
   </p:cSld>
@@ -4867,6 +4995,125 @@
           <p:cNvPr id="2" name="Title 1">
             <a:extLst>
               <a:ext uri="{FF2B5EF4-FFF2-40B4-BE49-F238E27FC236}">
+                <a16:creationId xmlns:a16="http://schemas.microsoft.com/office/drawing/2014/main" id="{BDC38D4A-892F-8A49-ADD8-26F17924D33F}"/>
+              </a:ext>
+            </a:extLst>
+          </p:cNvPr>
+          <p:cNvSpPr>
+            <a:spLocks noGrp="1"/>
+          </p:cNvSpPr>
+          <p:nvPr>
+            <p:ph type="title"/>
+          </p:nvPr>
+        </p:nvSpPr>
+        <p:spPr/>
+        <p:txBody>
+          <a:bodyPr/>
+          <a:lstStyle/>
+          <a:p>
+            <a:r>
+              <a:rPr lang="en-US" dirty="0"/>
+              <a:t>4 Questions to Address</a:t>
+            </a:r>
+          </a:p>
+        </p:txBody>
+      </p:sp>
+      <p:sp>
+        <p:nvSpPr>
+          <p:cNvPr id="4" name="Content Placeholder 3">
+            <a:extLst>
+              <a:ext uri="{FF2B5EF4-FFF2-40B4-BE49-F238E27FC236}">
+                <a16:creationId xmlns:a16="http://schemas.microsoft.com/office/drawing/2014/main" id="{39BC6378-DC6A-8E4F-9CD9-065CF6B37E02}"/>
+              </a:ext>
+            </a:extLst>
+          </p:cNvPr>
+          <p:cNvSpPr>
+            <a:spLocks noGrp="1"/>
+          </p:cNvSpPr>
+          <p:nvPr>
+            <p:ph idx="1"/>
+          </p:nvPr>
+        </p:nvSpPr>
+        <p:spPr/>
+        <p:txBody>
+          <a:bodyPr/>
+          <a:lstStyle/>
+          <a:p>
+            <a:r>
+              <a:rPr lang="en-US" dirty="0"/>
+              <a:t>Global Suicide Rate (2016 to 2020) ?</a:t>
+            </a:r>
+          </a:p>
+          <a:p>
+            <a:endParaRPr lang="en-US" dirty="0"/>
+          </a:p>
+          <a:p>
+            <a:r>
+              <a:rPr lang="en-US" dirty="0"/>
+              <a:t>Global Suicide Rate by Age group (2016 to 2020) ?</a:t>
+            </a:r>
+          </a:p>
+          <a:p>
+            <a:endParaRPr lang="en-US" dirty="0"/>
+          </a:p>
+          <a:p>
+            <a:r>
+              <a:rPr lang="en-US" dirty="0"/>
+              <a:t>Global Suicide Rate by Gender (2016 to 2020) ?</a:t>
+            </a:r>
+          </a:p>
+          <a:p>
+            <a:endParaRPr lang="en-US" dirty="0"/>
+          </a:p>
+          <a:p>
+            <a:r>
+              <a:rPr lang="en-US" dirty="0"/>
+              <a:t>United States Suicide Rate (2005 to 2021)</a:t>
+            </a:r>
+          </a:p>
+          <a:p>
+            <a:endParaRPr lang="en-US" dirty="0"/>
+          </a:p>
+          <a:p>
+            <a:endParaRPr lang="en-US" dirty="0"/>
+          </a:p>
+        </p:txBody>
+      </p:sp>
+    </p:spTree>
+    <p:extLst>
+      <p:ext uri="{BB962C8B-B14F-4D97-AF65-F5344CB8AC3E}">
+        <p14:creationId xmlns:p14="http://schemas.microsoft.com/office/powerpoint/2010/main" val="3799763869"/>
+      </p:ext>
+    </p:extLst>
+  </p:cSld>
+  <p:clrMapOvr>
+    <a:masterClrMapping/>
+  </p:clrMapOvr>
+</p:sld>
+</file>
+
+<file path=ppt/slides/slide8.xml><?xml version="1.0" encoding="utf-8"?>
+<p:sld xmlns:a="http://schemas.openxmlformats.org/drawingml/2006/main" xmlns:r="http://schemas.openxmlformats.org/officeDocument/2006/relationships" xmlns:p="http://schemas.openxmlformats.org/presentationml/2006/main">
+  <p:cSld>
+    <p:spTree>
+      <p:nvGrpSpPr>
+        <p:cNvPr id="1" name=""/>
+        <p:cNvGrpSpPr/>
+        <p:nvPr/>
+      </p:nvGrpSpPr>
+      <p:grpSpPr>
+        <a:xfrm>
+          <a:off x="0" y="0"/>
+          <a:ext cx="0" cy="0"/>
+          <a:chOff x="0" y="0"/>
+          <a:chExt cx="0" cy="0"/>
+        </a:xfrm>
+      </p:grpSpPr>
+      <p:sp>
+        <p:nvSpPr>
+          <p:cNvPr id="2" name="Title 1">
+            <a:extLst>
+              <a:ext uri="{FF2B5EF4-FFF2-40B4-BE49-F238E27FC236}">
                 <a16:creationId xmlns:a16="http://schemas.microsoft.com/office/drawing/2014/main" id="{F78BAA11-9060-7410-E78A-1E85F076BC9A}"/>
               </a:ext>
             </a:extLst>
@@ -4878,25 +5125,38 @@
             <p:ph type="title"/>
           </p:nvPr>
         </p:nvSpPr>
-        <p:spPr/>
-        <p:txBody>
-          <a:bodyPr/>
-          <a:lstStyle/>
-          <a:p>
-            <a:r>
-              <a:rPr lang="en-US"/>
-              <a:t>Code continued ….</a:t>
-            </a:r>
-            <a:endParaRPr lang="en-US" dirty="0"/>
+        <p:spPr>
+          <a:xfrm>
+            <a:off x="838200" y="365125"/>
+            <a:ext cx="4589206" cy="1325563"/>
+          </a:xfrm>
+        </p:spPr>
+        <p:txBody>
+          <a:bodyPr>
+            <a:normAutofit fontScale="90000"/>
+          </a:bodyPr>
+          <a:lstStyle/>
+          <a:p>
+            <a:r>
+              <a:rPr lang="en-US" b="1" dirty="0"/>
+              <a:t>Results</a:t>
+            </a:r>
+            <a:br>
+              <a:rPr lang="en-US" b="1" dirty="0"/>
+            </a:br>
+            <a:r>
+              <a:rPr lang="en-US" sz="2700" b="1" dirty="0"/>
+              <a:t>Global Suicide Rate (2016 to 2020)</a:t>
+            </a:r>
           </a:p>
         </p:txBody>
       </p:sp>
       <p:pic>
         <p:nvPicPr>
-          <p:cNvPr id="5" name="Content Placeholder 4">
-            <a:extLst>
-              <a:ext uri="{FF2B5EF4-FFF2-40B4-BE49-F238E27FC236}">
-                <a16:creationId xmlns:a16="http://schemas.microsoft.com/office/drawing/2014/main" id="{802CBA16-0F80-29D4-F423-607853611BA7}"/>
+          <p:cNvPr id="12" name="Content Placeholder 11">
+            <a:extLst>
+              <a:ext uri="{FF2B5EF4-FFF2-40B4-BE49-F238E27FC236}">
+                <a16:creationId xmlns:a16="http://schemas.microsoft.com/office/drawing/2014/main" id="{5016057F-407D-8D68-E2E2-760684F661E8}"/>
               </a:ext>
             </a:extLst>
           </p:cNvPr>
@@ -4915,17 +5175,211 @@
         </p:blipFill>
         <p:spPr>
           <a:xfrm>
-            <a:off x="939028" y="1825625"/>
-            <a:ext cx="4748885" cy="4351338"/>
+            <a:off x="5348750" y="88030"/>
+            <a:ext cx="5112774" cy="3756383"/>
           </a:xfrm>
         </p:spPr>
       </p:pic>
+      <p:sp>
+        <p:nvSpPr>
+          <p:cNvPr id="13" name="Title 1">
+            <a:extLst>
+              <a:ext uri="{FF2B5EF4-FFF2-40B4-BE49-F238E27FC236}">
+                <a16:creationId xmlns:a16="http://schemas.microsoft.com/office/drawing/2014/main" id="{0EFC1818-5B22-3081-D6E9-F2C37E708337}"/>
+              </a:ext>
+            </a:extLst>
+          </p:cNvPr>
+          <p:cNvSpPr txBox="1">
+            <a:spLocks/>
+          </p:cNvSpPr>
+          <p:nvPr/>
+        </p:nvSpPr>
+        <p:spPr>
+          <a:xfrm>
+            <a:off x="479323" y="1936955"/>
+            <a:ext cx="4589206" cy="3864077"/>
+          </a:xfrm>
+          <a:prstGeom prst="rect">
+            <a:avLst/>
+          </a:prstGeom>
+        </p:spPr>
+        <p:txBody>
+          <a:bodyPr vert="horz" lIns="91440" tIns="45720" rIns="91440" bIns="45720" rtlCol="0" anchor="ctr">
+            <a:normAutofit/>
+          </a:bodyPr>
+          <a:lstStyle>
+            <a:lvl1pPr algn="l" defTabSz="914400" rtl="0" eaLnBrk="1" latinLnBrk="0" hangingPunct="1">
+              <a:lnSpc>
+                <a:spcPct val="90000"/>
+              </a:lnSpc>
+              <a:spcBef>
+                <a:spcPct val="0"/>
+              </a:spcBef>
+              <a:buNone/>
+              <a:defRPr sz="4400" kern="1200">
+                <a:solidFill>
+                  <a:schemeClr val="tx1"/>
+                </a:solidFill>
+                <a:latin typeface="+mj-lt"/>
+                <a:ea typeface="+mj-ea"/>
+                <a:cs typeface="+mj-cs"/>
+              </a:defRPr>
+            </a:lvl1pPr>
+          </a:lstStyle>
+          <a:p>
+            <a:endParaRPr lang="en-US" dirty="0"/>
+          </a:p>
+        </p:txBody>
+      </p:sp>
+      <p:sp>
+        <p:nvSpPr>
+          <p:cNvPr id="14" name="Title 1">
+            <a:extLst>
+              <a:ext uri="{FF2B5EF4-FFF2-40B4-BE49-F238E27FC236}">
+                <a16:creationId xmlns:a16="http://schemas.microsoft.com/office/drawing/2014/main" id="{D55043FD-4633-30B3-DB24-FCE733C0413D}"/>
+              </a:ext>
+            </a:extLst>
+          </p:cNvPr>
+          <p:cNvSpPr txBox="1">
+            <a:spLocks/>
+          </p:cNvSpPr>
+          <p:nvPr/>
+        </p:nvSpPr>
+        <p:spPr>
+          <a:xfrm>
+            <a:off x="371167" y="2086205"/>
+            <a:ext cx="4589206" cy="2938079"/>
+          </a:xfrm>
+          <a:prstGeom prst="rect">
+            <a:avLst/>
+          </a:prstGeom>
+        </p:spPr>
+        <p:txBody>
+          <a:bodyPr vert="horz" lIns="91440" tIns="45720" rIns="91440" bIns="45720" rtlCol="0" anchor="ctr">
+            <a:normAutofit/>
+          </a:bodyPr>
+          <a:lstStyle>
+            <a:lvl1pPr algn="l" defTabSz="914400" rtl="0" eaLnBrk="1" latinLnBrk="0" hangingPunct="1">
+              <a:lnSpc>
+                <a:spcPct val="90000"/>
+              </a:lnSpc>
+              <a:spcBef>
+                <a:spcPct val="0"/>
+              </a:spcBef>
+              <a:buNone/>
+              <a:defRPr sz="4400" kern="1200">
+                <a:solidFill>
+                  <a:schemeClr val="tx1"/>
+                </a:solidFill>
+                <a:latin typeface="+mj-lt"/>
+                <a:ea typeface="+mj-ea"/>
+                <a:cs typeface="+mj-cs"/>
+              </a:defRPr>
+            </a:lvl1pPr>
+          </a:lstStyle>
+          <a:p>
+            <a:endParaRPr lang="en-US" dirty="0"/>
+          </a:p>
+        </p:txBody>
+      </p:sp>
+      <p:sp>
+        <p:nvSpPr>
+          <p:cNvPr id="15" name="Title 1">
+            <a:extLst>
+              <a:ext uri="{FF2B5EF4-FFF2-40B4-BE49-F238E27FC236}">
+                <a16:creationId xmlns:a16="http://schemas.microsoft.com/office/drawing/2014/main" id="{C9431CF1-78A0-80FF-30F3-0E3BA5CB4436}"/>
+              </a:ext>
+            </a:extLst>
+          </p:cNvPr>
+          <p:cNvSpPr txBox="1">
+            <a:spLocks/>
+          </p:cNvSpPr>
+          <p:nvPr/>
+        </p:nvSpPr>
+        <p:spPr>
+          <a:xfrm>
+            <a:off x="287595" y="1514168"/>
+            <a:ext cx="4589206" cy="3864077"/>
+          </a:xfrm>
+          <a:prstGeom prst="rect">
+            <a:avLst/>
+          </a:prstGeom>
+        </p:spPr>
+        <p:txBody>
+          <a:bodyPr vert="horz" lIns="91440" tIns="45720" rIns="91440" bIns="45720" rtlCol="0" anchor="ctr">
+            <a:normAutofit/>
+          </a:bodyPr>
+          <a:lstStyle>
+            <a:lvl1pPr algn="l" defTabSz="914400" rtl="0" eaLnBrk="1" latinLnBrk="0" hangingPunct="1">
+              <a:lnSpc>
+                <a:spcPct val="90000"/>
+              </a:lnSpc>
+              <a:spcBef>
+                <a:spcPct val="0"/>
+              </a:spcBef>
+              <a:buNone/>
+              <a:defRPr sz="4400" kern="1200">
+                <a:solidFill>
+                  <a:schemeClr val="tx1"/>
+                </a:solidFill>
+                <a:latin typeface="+mj-lt"/>
+                <a:ea typeface="+mj-ea"/>
+                <a:cs typeface="+mj-cs"/>
+              </a:defRPr>
+            </a:lvl1pPr>
+          </a:lstStyle>
+          <a:p>
+            <a:pPr marL="342900" indent="-342900">
+              <a:buFont typeface="Arial" panose="020B0604020202020204" pitchFamily="34" charset="0"/>
+              <a:buChar char="•"/>
+            </a:pPr>
+            <a:r>
+              <a:rPr lang="en-US" sz="2400" dirty="0"/>
+              <a:t>A five-year span was examined globally from 2016 to 2020</a:t>
+            </a:r>
+          </a:p>
+          <a:p>
+            <a:pPr marL="342900" indent="-342900">
+              <a:buFont typeface="Arial" panose="020B0604020202020204" pitchFamily="34" charset="0"/>
+              <a:buChar char="•"/>
+            </a:pPr>
+            <a:endParaRPr lang="en-US" sz="2400" dirty="0"/>
+          </a:p>
+          <a:p>
+            <a:pPr marL="342900" indent="-342900">
+              <a:buFont typeface="Arial" panose="020B0604020202020204" pitchFamily="34" charset="0"/>
+              <a:buChar char="•"/>
+            </a:pPr>
+            <a:r>
+              <a:rPr lang="en-US" sz="2400" dirty="0"/>
+              <a:t>The suicide rate was observed to be steady from 2016 to 2019</a:t>
+            </a:r>
+          </a:p>
+          <a:p>
+            <a:pPr marL="342900" indent="-342900">
+              <a:buFont typeface="Arial" panose="020B0604020202020204" pitchFamily="34" charset="0"/>
+              <a:buChar char="•"/>
+            </a:pPr>
+            <a:endParaRPr lang="en-US" sz="2400" dirty="0"/>
+          </a:p>
+          <a:p>
+            <a:pPr marL="342900" indent="-342900">
+              <a:buFont typeface="Arial" panose="020B0604020202020204" pitchFamily="34" charset="0"/>
+              <a:buChar char="•"/>
+            </a:pPr>
+            <a:r>
+              <a:rPr lang="en-US" sz="2400" dirty="0"/>
+              <a:t>There was a sharp increase in 2020, which is suspected to be linked to the effects of Covid-19</a:t>
+            </a:r>
+          </a:p>
+        </p:txBody>
+      </p:sp>
       <p:pic>
         <p:nvPicPr>
-          <p:cNvPr id="7" name="Picture 6">
-            <a:extLst>
-              <a:ext uri="{FF2B5EF4-FFF2-40B4-BE49-F238E27FC236}">
-                <a16:creationId xmlns:a16="http://schemas.microsoft.com/office/drawing/2014/main" id="{20D9B4CA-94AD-91D8-D3A2-BD291823D496}"/>
+          <p:cNvPr id="17" name="Picture 16">
+            <a:extLst>
+              <a:ext uri="{FF2B5EF4-FFF2-40B4-BE49-F238E27FC236}">
+                <a16:creationId xmlns:a16="http://schemas.microsoft.com/office/drawing/2014/main" id="{FBF5E5D7-17AC-2B29-2F13-6F86A367054A}"/>
               </a:ext>
             </a:extLst>
           </p:cNvPr>
@@ -4942,8 +5396,8 @@
         </p:blipFill>
         <p:spPr>
           <a:xfrm>
-            <a:off x="6408608" y="1644046"/>
-            <a:ext cx="5399933" cy="4532915"/>
+            <a:off x="5348750" y="3794495"/>
+            <a:ext cx="5034115" cy="3063505"/>
           </a:xfrm>
           <a:prstGeom prst="rect">
             <a:avLst/>
@@ -4954,6 +5408,103 @@
     <p:extLst>
       <p:ext uri="{BB962C8B-B14F-4D97-AF65-F5344CB8AC3E}">
         <p14:creationId xmlns:p14="http://schemas.microsoft.com/office/powerpoint/2010/main" val="1504725780"/>
+      </p:ext>
+    </p:extLst>
+  </p:cSld>
+  <p:clrMapOvr>
+    <a:masterClrMapping/>
+  </p:clrMapOvr>
+</p:sld>
+</file>
+
+<file path=ppt/slides/slide9.xml><?xml version="1.0" encoding="utf-8"?>
+<p:sld xmlns:a="http://schemas.openxmlformats.org/drawingml/2006/main" xmlns:r="http://schemas.openxmlformats.org/officeDocument/2006/relationships" xmlns:p="http://schemas.openxmlformats.org/presentationml/2006/main">
+  <p:cSld>
+    <p:spTree>
+      <p:nvGrpSpPr>
+        <p:cNvPr id="1" name=""/>
+        <p:cNvGrpSpPr/>
+        <p:nvPr/>
+      </p:nvGrpSpPr>
+      <p:grpSpPr>
+        <a:xfrm>
+          <a:off x="0" y="0"/>
+          <a:ext cx="0" cy="0"/>
+          <a:chOff x="0" y="0"/>
+          <a:chExt cx="0" cy="0"/>
+        </a:xfrm>
+      </p:grpSpPr>
+      <p:sp>
+        <p:nvSpPr>
+          <p:cNvPr id="2" name="Title 1">
+            <a:extLst>
+              <a:ext uri="{FF2B5EF4-FFF2-40B4-BE49-F238E27FC236}">
+                <a16:creationId xmlns:a16="http://schemas.microsoft.com/office/drawing/2014/main" id="{004F0F32-41F5-FC05-71FC-8A9473605462}"/>
+              </a:ext>
+            </a:extLst>
+          </p:cNvPr>
+          <p:cNvSpPr>
+            <a:spLocks noGrp="1"/>
+          </p:cNvSpPr>
+          <p:nvPr>
+            <p:ph type="title"/>
+          </p:nvPr>
+        </p:nvSpPr>
+        <p:spPr>
+          <a:xfrm>
+            <a:off x="838200" y="365125"/>
+            <a:ext cx="4894006" cy="1325563"/>
+          </a:xfrm>
+        </p:spPr>
+        <p:txBody>
+          <a:bodyPr>
+            <a:normAutofit/>
+          </a:bodyPr>
+          <a:lstStyle/>
+          <a:p>
+            <a:r>
+              <a:rPr lang="en-US" dirty="0"/>
+              <a:t>Results Continued …</a:t>
+            </a:r>
+            <a:br>
+              <a:rPr lang="en-US" dirty="0"/>
+            </a:br>
+            <a:r>
+              <a:rPr lang="en-US" sz="2700" dirty="0"/>
+              <a:t>Global Suicide Rate by Age Group</a:t>
+            </a:r>
+          </a:p>
+        </p:txBody>
+      </p:sp>
+      <p:sp>
+        <p:nvSpPr>
+          <p:cNvPr id="3" name="Content Placeholder 2">
+            <a:extLst>
+              <a:ext uri="{FF2B5EF4-FFF2-40B4-BE49-F238E27FC236}">
+                <a16:creationId xmlns:a16="http://schemas.microsoft.com/office/drawing/2014/main" id="{FE7A1C3E-909C-594D-B06E-EB84A9321F74}"/>
+              </a:ext>
+            </a:extLst>
+          </p:cNvPr>
+          <p:cNvSpPr>
+            <a:spLocks noGrp="1"/>
+          </p:cNvSpPr>
+          <p:nvPr>
+            <p:ph idx="1"/>
+          </p:nvPr>
+        </p:nvSpPr>
+        <p:spPr/>
+        <p:txBody>
+          <a:bodyPr/>
+          <a:lstStyle/>
+          <a:p>
+            <a:endParaRPr lang="en-US" dirty="0"/>
+          </a:p>
+        </p:txBody>
+      </p:sp>
+    </p:spTree>
+    <p:extLst>
+      <p:ext uri="{BB962C8B-B14F-4D97-AF65-F5344CB8AC3E}">
+        <p14:creationId xmlns:p14="http://schemas.microsoft.com/office/powerpoint/2010/main" val="2273328587"/>
       </p:ext>
     </p:extLst>
   </p:cSld>

</xml_diff>